<commit_message>
Added block2 code of group
</commit_message>
<xml_diff>
--- a/Machine_Learning/lecture/Lecture2c.pptx
+++ b/Machine_Learning/lecture/Lecture2c.pptx
@@ -2,41 +2,41 @@
 <file path=ppt/presentation.xml><?xml version="1.0" encoding="utf-8"?>
 <p:presentation xmlns:a="http://schemas.openxmlformats.org/drawingml/2006/main" xmlns:r="http://schemas.openxmlformats.org/officeDocument/2006/relationships" xmlns:p="http://schemas.openxmlformats.org/presentationml/2006/main" saveSubsetFonts="1">
   <p:sldMasterIdLst>
-    <p:sldMasterId id="2147483918" r:id="rId1"/>
+    <p:sldMasterId id="2147483918" r:id="rId4"/>
   </p:sldMasterIdLst>
   <p:notesMasterIdLst>
-    <p:notesMasterId r:id="rId31"/>
+    <p:notesMasterId r:id="rId34"/>
   </p:notesMasterIdLst>
   <p:sldIdLst>
-    <p:sldId id="256" r:id="rId2"/>
-    <p:sldId id="376" r:id="rId3"/>
-    <p:sldId id="342" r:id="rId4"/>
-    <p:sldId id="343" r:id="rId5"/>
-    <p:sldId id="344" r:id="rId6"/>
-    <p:sldId id="346" r:id="rId7"/>
-    <p:sldId id="347" r:id="rId8"/>
-    <p:sldId id="341" r:id="rId9"/>
-    <p:sldId id="353" r:id="rId10"/>
-    <p:sldId id="354" r:id="rId11"/>
-    <p:sldId id="329" r:id="rId12"/>
-    <p:sldId id="332" r:id="rId13"/>
-    <p:sldId id="331" r:id="rId14"/>
-    <p:sldId id="356" r:id="rId15"/>
-    <p:sldId id="358" r:id="rId16"/>
-    <p:sldId id="330" r:id="rId17"/>
-    <p:sldId id="340" r:id="rId18"/>
-    <p:sldId id="337" r:id="rId19"/>
-    <p:sldId id="359" r:id="rId20"/>
-    <p:sldId id="338" r:id="rId21"/>
-    <p:sldId id="373" r:id="rId22"/>
-    <p:sldId id="375" r:id="rId23"/>
-    <p:sldId id="362" r:id="rId24"/>
-    <p:sldId id="377" r:id="rId25"/>
-    <p:sldId id="363" r:id="rId26"/>
-    <p:sldId id="378" r:id="rId27"/>
-    <p:sldId id="335" r:id="rId28"/>
-    <p:sldId id="372" r:id="rId29"/>
-    <p:sldId id="371" r:id="rId30"/>
+    <p:sldId id="256" r:id="rId5"/>
+    <p:sldId id="376" r:id="rId6"/>
+    <p:sldId id="342" r:id="rId7"/>
+    <p:sldId id="343" r:id="rId8"/>
+    <p:sldId id="344" r:id="rId9"/>
+    <p:sldId id="346" r:id="rId10"/>
+    <p:sldId id="347" r:id="rId11"/>
+    <p:sldId id="341" r:id="rId12"/>
+    <p:sldId id="353" r:id="rId13"/>
+    <p:sldId id="354" r:id="rId14"/>
+    <p:sldId id="329" r:id="rId15"/>
+    <p:sldId id="332" r:id="rId16"/>
+    <p:sldId id="331" r:id="rId17"/>
+    <p:sldId id="356" r:id="rId18"/>
+    <p:sldId id="358" r:id="rId19"/>
+    <p:sldId id="330" r:id="rId20"/>
+    <p:sldId id="340" r:id="rId21"/>
+    <p:sldId id="337" r:id="rId22"/>
+    <p:sldId id="359" r:id="rId23"/>
+    <p:sldId id="338" r:id="rId24"/>
+    <p:sldId id="373" r:id="rId25"/>
+    <p:sldId id="375" r:id="rId26"/>
+    <p:sldId id="362" r:id="rId27"/>
+    <p:sldId id="377" r:id="rId28"/>
+    <p:sldId id="363" r:id="rId29"/>
+    <p:sldId id="378" r:id="rId30"/>
+    <p:sldId id="335" r:id="rId31"/>
+    <p:sldId id="372" r:id="rId32"/>
+    <p:sldId id="371" r:id="rId33"/>
   </p:sldIdLst>
   <p:sldSz cx="9144000" cy="6858000" type="screen4x3"/>
   <p:notesSz cx="6858000" cy="9144000"/>
@@ -184,6 +184,35 @@
 </p:presentation>
 </file>
 
+<file path=ppt/changesInfos/changesInfo1.xml><?xml version="1.0" encoding="utf-8"?>
+<pc:chgInfo xmlns:a="http://schemas.openxmlformats.org/drawingml/2006/main" xmlns:r="http://schemas.openxmlformats.org/officeDocument/2006/relationships" xmlns:ac="http://schemas.microsoft.com/office/drawing/2013/main/command" xmlns:pc="http://schemas.microsoft.com/office/powerpoint/2013/main/command">
+  <pc:docChgLst>
+    <pc:chgData name="Anubhav Dikshit" userId="26477bb37de0bdc7" providerId="LiveId" clId="{0CC2256D-E08D-41B9-9A48-F63C258C1AAF}"/>
+    <pc:docChg chg="modSld">
+      <pc:chgData name="Anubhav Dikshit" userId="26477bb37de0bdc7" providerId="LiveId" clId="{0CC2256D-E08D-41B9-9A48-F63C258C1AAF}" dt="2018-12-01T20:01:52.134" v="0" actId="20577"/>
+      <pc:docMkLst>
+        <pc:docMk/>
+      </pc:docMkLst>
+      <pc:sldChg chg="modSp">
+        <pc:chgData name="Anubhav Dikshit" userId="26477bb37de0bdc7" providerId="LiveId" clId="{0CC2256D-E08D-41B9-9A48-F63C258C1AAF}" dt="2018-12-01T20:01:52.134" v="0" actId="20577"/>
+        <pc:sldMkLst>
+          <pc:docMk/>
+          <pc:sldMk cId="2450599602" sldId="377"/>
+        </pc:sldMkLst>
+        <pc:spChg chg="mod">
+          <ac:chgData name="Anubhav Dikshit" userId="26477bb37de0bdc7" providerId="LiveId" clId="{0CC2256D-E08D-41B9-9A48-F63C258C1AAF}" dt="2018-12-01T20:01:52.134" v="0" actId="20577"/>
+          <ac:spMkLst>
+            <pc:docMk/>
+            <pc:sldMk cId="2450599602" sldId="377"/>
+            <ac:spMk id="8" creationId="{87531C6A-4937-46ED-9370-63CD37B06E3F}"/>
+          </ac:spMkLst>
+        </pc:spChg>
+      </pc:sldChg>
+    </pc:docChg>
+  </pc:docChgLst>
+</pc:chgInfo>
+</file>
+
 <file path=ppt/notesMasters/notesMaster1.xml><?xml version="1.0" encoding="utf-8"?>
 <p:notesMaster xmlns:a="http://schemas.openxmlformats.org/drawingml/2006/main" xmlns:r="http://schemas.openxmlformats.org/officeDocument/2006/relationships" xmlns:p="http://schemas.openxmlformats.org/presentationml/2006/main">
   <p:cSld>
@@ -284,7 +313,7 @@
               <a:pPr>
                 <a:defRPr/>
               </a:pPr>
-              <a:t>11/16/2018</a:t>
+              <a:t>12/1/2018</a:t>
             </a:fld>
             <a:endParaRPr lang="en-US"/>
           </a:p>
@@ -886,7 +915,7 @@
             </a:pPr>
             <a:fld id="{2530DB7A-D164-4388-97DC-BFC8771EEA7F}" type="datetime1">
               <a:rPr lang="sv-SE" smtClean="0"/>
-              <a:t>2018-11-16</a:t>
+              <a:t>2018-12-01</a:t>
             </a:fld>
             <a:endParaRPr lang="sv-SE"/>
           </a:p>
@@ -1081,7 +1110,7 @@
             </a:pPr>
             <a:fld id="{6F742880-8A30-44DC-8DD2-629C1C4B871D}" type="datetime1">
               <a:rPr lang="sv-SE" smtClean="0"/>
-              <a:t>2018-11-16</a:t>
+              <a:t>2018-12-01</a:t>
             </a:fld>
             <a:endParaRPr lang="sv-SE"/>
           </a:p>
@@ -1286,7 +1315,7 @@
             </a:pPr>
             <a:fld id="{5F7E27E2-CB3D-4357-B279-1CB2484356C9}" type="datetime1">
               <a:rPr lang="sv-SE" smtClean="0"/>
-              <a:t>2018-11-16</a:t>
+              <a:t>2018-12-01</a:t>
             </a:fld>
             <a:endParaRPr lang="sv-SE"/>
           </a:p>
@@ -1609,7 +1638,7 @@
             </a:pPr>
             <a:fld id="{EF448226-6392-4592-8F5D-2651E663B4E9}" type="datetime1">
               <a:rPr lang="sv-SE" smtClean="0"/>
-              <a:t>2018-11-16</a:t>
+              <a:t>2018-12-01</a:t>
             </a:fld>
             <a:endParaRPr lang="en-GB"/>
           </a:p>
@@ -1809,7 +1838,7 @@
             </a:pPr>
             <a:fld id="{B4FCBB38-B45E-4F2F-A7F6-E4A4D45D1534}" type="datetime1">
               <a:rPr lang="sv-SE" smtClean="0"/>
-              <a:t>2018-11-16</a:t>
+              <a:t>2018-12-01</a:t>
             </a:fld>
             <a:endParaRPr lang="sv-SE"/>
           </a:p>
@@ -2081,7 +2110,7 @@
             </a:pPr>
             <a:fld id="{F1BB51B2-15A0-4393-8D4A-741B554924B8}" type="datetime1">
               <a:rPr lang="sv-SE" smtClean="0"/>
-              <a:t>2018-11-16</a:t>
+              <a:t>2018-12-01</a:t>
             </a:fld>
             <a:endParaRPr lang="sv-SE"/>
           </a:p>
@@ -2393,7 +2422,7 @@
             </a:pPr>
             <a:fld id="{B4565642-37FC-4DF6-884E-180DE17ABCF3}" type="datetime1">
               <a:rPr lang="sv-SE" smtClean="0"/>
-              <a:t>2018-11-16</a:t>
+              <a:t>2018-12-01</a:t>
             </a:fld>
             <a:endParaRPr lang="sv-SE"/>
           </a:p>
@@ -2839,7 +2868,7 @@
             </a:pPr>
             <a:fld id="{0691759C-2E9E-4E1F-AF85-960E81372F34}" type="datetime1">
               <a:rPr lang="sv-SE" smtClean="0"/>
-              <a:t>2018-11-16</a:t>
+              <a:t>2018-12-01</a:t>
             </a:fld>
             <a:endParaRPr lang="sv-SE"/>
           </a:p>
@@ -2983,7 +3012,7 @@
             </a:pPr>
             <a:fld id="{B68D01BA-826F-42EA-97A3-DC815622370C}" type="datetime1">
               <a:rPr lang="sv-SE" smtClean="0"/>
-              <a:t>2018-11-16</a:t>
+              <a:t>2018-12-01</a:t>
             </a:fld>
             <a:endParaRPr lang="sv-SE"/>
           </a:p>
@@ -3105,7 +3134,7 @@
             </a:pPr>
             <a:fld id="{55196415-76FA-4E95-9954-685056720FB0}" type="datetime1">
               <a:rPr lang="sv-SE" smtClean="0"/>
-              <a:t>2018-11-16</a:t>
+              <a:t>2018-12-01</a:t>
             </a:fld>
             <a:endParaRPr lang="sv-SE"/>
           </a:p>
@@ -3407,7 +3436,7 @@
             </a:pPr>
             <a:fld id="{B31847DF-6D55-445B-B0FB-E557FDF6DB0D}" type="datetime1">
               <a:rPr lang="sv-SE" smtClean="0"/>
-              <a:t>2018-11-16</a:t>
+              <a:t>2018-12-01</a:t>
             </a:fld>
             <a:endParaRPr lang="sv-SE"/>
           </a:p>
@@ -3692,7 +3721,7 @@
             </a:pPr>
             <a:fld id="{391477DC-AA80-41D8-A3E2-63C87D0405DD}" type="datetime1">
               <a:rPr lang="sv-SE" smtClean="0"/>
-              <a:t>2018-11-16</a:t>
+              <a:t>2018-12-01</a:t>
             </a:fld>
             <a:endParaRPr lang="sv-SE"/>
           </a:p>
@@ -3986,7 +4015,7 @@
             </a:pPr>
             <a:fld id="{2A47BAE3-4F6F-4289-872C-43EA6486B855}" type="datetime1">
               <a:rPr lang="sv-SE" smtClean="0"/>
-              <a:t>2018-11-16</a:t>
+              <a:t>2018-12-01</a:t>
             </a:fld>
             <a:endParaRPr lang="sv-SE"/>
           </a:p>
@@ -6506,7 +6535,7 @@
           <a:graphicData uri="http://schemas.openxmlformats.org/presentationml/2006/ole">
             <mc:AlternateContent xmlns:mc="http://schemas.openxmlformats.org/markup-compatibility/2006">
               <mc:Choice xmlns:v="urn:schemas-microsoft-com:vml" Requires="v">
-                <p:oleObj spid="_x0000_s1299" name="Equation" r:id="rId3" imgW="812520" imgH="241200" progId="Equation.3">
+                <p:oleObj spid="_x0000_s1026" name="Equation" r:id="rId3" imgW="812520" imgH="241200" progId="Equation.3">
                   <p:embed/>
                 </p:oleObj>
               </mc:Choice>
@@ -6515,7 +6544,7 @@
                   <p:embed/>
                   <p:pic>
                     <p:nvPicPr>
-                      <p:cNvPr id="0" name=""/>
+                      <p:cNvPr id="7170" name="Object 4"/>
                       <p:cNvPicPr>
                         <a:picLocks noChangeAspect="1" noChangeArrowheads="1"/>
                       </p:cNvPicPr>
@@ -6576,7 +6605,7 @@
           <a:graphicData uri="http://schemas.openxmlformats.org/presentationml/2006/ole">
             <mc:AlternateContent xmlns:mc="http://schemas.openxmlformats.org/markup-compatibility/2006">
               <mc:Choice xmlns:v="urn:schemas-microsoft-com:vml" Requires="v">
-                <p:oleObj spid="_x0000_s1300" name="Equation" r:id="rId5" imgW="139680" imgH="164880" progId="Equation.3">
+                <p:oleObj spid="_x0000_s1027" name="Equation" r:id="rId5" imgW="139680" imgH="164880" progId="Equation.3">
                   <p:embed/>
                 </p:oleObj>
               </mc:Choice>
@@ -6585,7 +6614,7 @@
                   <p:embed/>
                   <p:pic>
                     <p:nvPicPr>
-                      <p:cNvPr id="0" name=""/>
+                      <p:cNvPr id="7171" name="Object 41"/>
                       <p:cNvPicPr>
                         <a:picLocks noChangeAspect="1" noChangeArrowheads="1"/>
                       </p:cNvPicPr>
@@ -8267,7 +8296,7 @@
           <a:graphicData uri="http://schemas.openxmlformats.org/presentationml/2006/ole">
             <mc:AlternateContent xmlns:mc="http://schemas.openxmlformats.org/markup-compatibility/2006">
               <mc:Choice xmlns:v="urn:schemas-microsoft-com:vml" Requires="v">
-                <p:oleObj spid="_x0000_s1301" name="Equation" r:id="rId7" imgW="799920" imgH="241200" progId="Equation.3">
+                <p:oleObj spid="_x0000_s1028" name="Equation" r:id="rId7" imgW="799920" imgH="241200" progId="Equation.3">
                   <p:embed/>
                 </p:oleObj>
               </mc:Choice>
@@ -8276,7 +8305,7 @@
                   <p:embed/>
                   <p:pic>
                     <p:nvPicPr>
-                      <p:cNvPr id="0" name=""/>
+                      <p:cNvPr id="7172" name="Object 42"/>
                       <p:cNvPicPr>
                         <a:picLocks noChangeAspect="1" noChangeArrowheads="1"/>
                       </p:cNvPicPr>
@@ -11129,7 +11158,7 @@
           <a:graphicData uri="http://schemas.openxmlformats.org/presentationml/2006/ole">
             <mc:AlternateContent xmlns:mc="http://schemas.openxmlformats.org/markup-compatibility/2006">
               <mc:Choice xmlns:v="urn:schemas-microsoft-com:vml" Requires="v">
-                <p:oleObj spid="_x0000_s2123" name="Ekvation" r:id="rId4" imgW="583920" imgH="241200" progId="Equation.3">
+                <p:oleObj spid="_x0000_s2050" name="Ekvation" r:id="rId4" imgW="583920" imgH="241200" progId="Equation.3">
                   <p:embed/>
                 </p:oleObj>
               </mc:Choice>
@@ -11138,7 +11167,7 @@
                   <p:embed/>
                   <p:pic>
                     <p:nvPicPr>
-                      <p:cNvPr id="0" name=""/>
+                      <p:cNvPr id="161795" name="Object 5"/>
                       <p:cNvPicPr>
                         <a:picLocks noChangeAspect="1" noChangeArrowheads="1"/>
                       </p:cNvPicPr>
@@ -16586,49 +16615,7 @@
                 <a:latin typeface="Consolas" panose="020B0609020204030204" pitchFamily="49" charset="0"/>
                 <a:cs typeface="Consolas" panose="020B0609020204030204" pitchFamily="49" charset="0"/>
               </a:rPr>
-              <a:t>  </a:t>
-            </a:r>
-            <a:r>
-              <a:rPr lang="sv-SE" sz="1600" dirty="0" err="1">
-                <a:latin typeface="Consolas" panose="020B0609020204030204" pitchFamily="49" charset="0"/>
-                <a:cs typeface="Consolas" panose="020B0609020204030204" pitchFamily="49" charset="0"/>
-              </a:rPr>
-              <a:t>priceP</a:t>
-            </a:r>
-            <a:r>
-              <a:rPr lang="sv-SE" sz="1600" dirty="0">
-                <a:latin typeface="Consolas" panose="020B0609020204030204" pitchFamily="49" charset="0"/>
-                <a:cs typeface="Consolas" panose="020B0609020204030204" pitchFamily="49" charset="0"/>
-              </a:rPr>
-              <a:t>=</a:t>
-            </a:r>
-            <a:r>
-              <a:rPr lang="sv-SE" sz="1600" dirty="0" err="1">
-                <a:latin typeface="Consolas" panose="020B0609020204030204" pitchFamily="49" charset="0"/>
-                <a:cs typeface="Consolas" panose="020B0609020204030204" pitchFamily="49" charset="0"/>
-              </a:rPr>
-              <a:t>predict</a:t>
-            </a:r>
-            <a:r>
-              <a:rPr lang="sv-SE" sz="1600" dirty="0">
-                <a:latin typeface="Consolas" panose="020B0609020204030204" pitchFamily="49" charset="0"/>
-                <a:cs typeface="Consolas" panose="020B0609020204030204" pitchFamily="49" charset="0"/>
-              </a:rPr>
-              <a:t>(</a:t>
-            </a:r>
-            <a:r>
-              <a:rPr lang="sv-SE" sz="1600" dirty="0" err="1">
-                <a:latin typeface="Consolas" panose="020B0609020204030204" pitchFamily="49" charset="0"/>
-                <a:cs typeface="Consolas" panose="020B0609020204030204" pitchFamily="49" charset="0"/>
-              </a:rPr>
-              <a:t>res,newdata</a:t>
-            </a:r>
-            <a:r>
-              <a:rPr lang="sv-SE" sz="1600" dirty="0">
-                <a:latin typeface="Consolas" panose="020B0609020204030204" pitchFamily="49" charset="0"/>
-                <a:cs typeface="Consolas" panose="020B0609020204030204" pitchFamily="49" charset="0"/>
-              </a:rPr>
-              <a:t>=data2) </a:t>
+              <a:t>  priceP=predict(res, newdata=data2) </a:t>
             </a:r>
           </a:p>
           <a:p>
@@ -23202,8 +23189,8 @@
           </a:p>
         </p:txBody>
       </p:sp>
-      <mc:AlternateContent xmlns:mc="http://schemas.openxmlformats.org/markup-compatibility/2006">
-        <mc:Choice xmlns:a14="http://schemas.microsoft.com/office/drawing/2010/main" Requires="a14">
+      <mc:AlternateContent xmlns:mc="http://schemas.openxmlformats.org/markup-compatibility/2006" xmlns:a14="http://schemas.microsoft.com/office/drawing/2010/main">
+        <mc:Choice Requires="a14">
           <p:sp>
             <p:nvSpPr>
               <p:cNvPr id="8" name="Platshållare för innehåll 7">
@@ -23463,7 +23450,7 @@
             </p:txBody>
           </p:sp>
         </mc:Choice>
-        <mc:Fallback>
+        <mc:Fallback xmlns="">
           <p:sp>
             <p:nvSpPr>
               <p:cNvPr id="8" name="Platshållare för innehåll 7">
@@ -25087,6 +25074,15 @@
 </file>
 
 <file path=customXml/item1.xml><?xml version="1.0" encoding="utf-8"?>
+<?mso-contentType ?>
+<FormTemplates xmlns="http://schemas.microsoft.com/sharepoint/v3/contenttype/forms">
+  <Display>DocumentLibraryForm</Display>
+  <Edit>DocumentLibraryForm</Edit>
+  <New>DocumentLibraryForm</New>
+</FormTemplates>
+</file>
+
+<file path=customXml/item2.xml><?xml version="1.0" encoding="utf-8"?>
 <ct:contentTypeSchema xmlns:ct="http://schemas.microsoft.com/office/2006/metadata/contentType" xmlns:ma="http://schemas.microsoft.com/office/2006/metadata/properties/metaAttributes" ct:_="" ma:_="" ma:contentTypeName="Document" ma:contentTypeID="0x010100600139FD588BE54283917262912FC268" ma:contentTypeVersion="6" ma:contentTypeDescription="Create a new document." ma:contentTypeScope="" ma:versionID="c529fd89aed1bf49d735ec888ef25acc">
   <xsd:schema xmlns:xsd="http://www.w3.org/2001/XMLSchema" xmlns:xs="http://www.w3.org/2001/XMLSchema" xmlns:p="http://schemas.microsoft.com/office/2006/metadata/properties" xmlns:ns1="http://schemas.microsoft.com/sharepoint/v3" xmlns:ns2="108a5a92-ae9d-4381-85f3-3c746b140ccd" xmlns:ns3="8a43ac29-7517-4eef-8263-50e5e3d65f27" targetNamespace="http://schemas.microsoft.com/office/2006/metadata/properties" ma:root="true" ma:fieldsID="f4d50ce08891c13905be8b06bca1bcba" ns1:_="" ns2:_="" ns3:_="">
     <xsd:import namespace="http://schemas.microsoft.com/sharepoint/v3"/>
@@ -25254,15 +25250,6 @@
 </ct:contentTypeSchema>
 </file>
 
-<file path=customXml/item2.xml><?xml version="1.0" encoding="utf-8"?>
-<?mso-contentType ?>
-<FormTemplates xmlns="http://schemas.microsoft.com/sharepoint/v3/contenttype/forms">
-  <Display>DocumentLibraryForm</Display>
-  <Edit>DocumentLibraryForm</Edit>
-  <New>DocumentLibraryForm</New>
-</FormTemplates>
-</file>
-
 <file path=customXml/item3.xml><?xml version="1.0" encoding="utf-8"?>
 <p:properties xmlns:p="http://schemas.microsoft.com/office/2006/metadata/properties" xmlns:xsi="http://www.w3.org/2001/XMLSchema-instance" xmlns:pc="http://schemas.microsoft.com/office/infopath/2007/PartnerControls">
   <documentManagement>
@@ -25275,13 +25262,41 @@
 </file>
 
 <file path=customXml/itemProps1.xml><?xml version="1.0" encoding="utf-8"?>
-<ds:datastoreItem xmlns:ds="http://schemas.openxmlformats.org/officeDocument/2006/customXml" ds:itemID="{F675A9DE-867A-4DAC-B3E5-E2E9E0644B5B}"/>
+<ds:datastoreItem xmlns:ds="http://schemas.openxmlformats.org/officeDocument/2006/customXml" ds:itemID="{B94BC638-C4FB-4048-8F1C-E3EF7A45618D}">
+  <ds:schemaRefs>
+    <ds:schemaRef ds:uri="http://schemas.microsoft.com/sharepoint/v3/contenttype/forms"/>
+  </ds:schemaRefs>
+</ds:datastoreItem>
 </file>
 
 <file path=customXml/itemProps2.xml><?xml version="1.0" encoding="utf-8"?>
-<ds:datastoreItem xmlns:ds="http://schemas.openxmlformats.org/officeDocument/2006/customXml" ds:itemID="{B94BC638-C4FB-4048-8F1C-E3EF7A45618D}"/>
+<ds:datastoreItem xmlns:ds="http://schemas.openxmlformats.org/officeDocument/2006/customXml" ds:itemID="{F675A9DE-867A-4DAC-B3E5-E2E9E0644B5B}">
+  <ds:schemaRefs>
+    <ds:schemaRef ds:uri="http://schemas.microsoft.com/office/2006/metadata/contentType"/>
+    <ds:schemaRef ds:uri="http://schemas.microsoft.com/office/2006/metadata/properties/metaAttributes"/>
+    <ds:schemaRef ds:uri="http://www.w3.org/2001/XMLSchema"/>
+    <ds:schemaRef ds:uri="http://schemas.microsoft.com/office/2006/metadata/properties"/>
+    <ds:schemaRef ds:uri="http://schemas.microsoft.com/sharepoint/v3"/>
+    <ds:schemaRef ds:uri="108a5a92-ae9d-4381-85f3-3c746b140ccd"/>
+    <ds:schemaRef ds:uri="8a43ac29-7517-4eef-8263-50e5e3d65f27"/>
+    <ds:schemaRef ds:uri="http://schemas.microsoft.com/office/2006/documentManagement/types"/>
+    <ds:schemaRef ds:uri="http://schemas.microsoft.com/office/infopath/2007/PartnerControls"/>
+    <ds:schemaRef ds:uri="http://schemas.openxmlformats.org/package/2006/metadata/core-properties"/>
+    <ds:schemaRef ds:uri="http://purl.org/dc/elements/1.1/"/>
+    <ds:schemaRef ds:uri="http://purl.org/dc/terms/"/>
+    <ds:schemaRef ds:uri="http://schemas.microsoft.com/internal/obd"/>
+  </ds:schemaRefs>
+</ds:datastoreItem>
 </file>
 
 <file path=customXml/itemProps3.xml><?xml version="1.0" encoding="utf-8"?>
-<ds:datastoreItem xmlns:ds="http://schemas.openxmlformats.org/officeDocument/2006/customXml" ds:itemID="{EB750D11-7A23-45B0-93B5-6D0E4FF531EE}"/>
+<ds:datastoreItem xmlns:ds="http://schemas.openxmlformats.org/officeDocument/2006/customXml" ds:itemID="{EB750D11-7A23-45B0-93B5-6D0E4FF531EE}">
+  <ds:schemaRefs>
+    <ds:schemaRef ds:uri="http://schemas.microsoft.com/office/2006/metadata/properties"/>
+    <ds:schemaRef ds:uri="http://schemas.microsoft.com/office/infopath/2007/PartnerControls"/>
+    <ds:schemaRef ds:uri="108a5a92-ae9d-4381-85f3-3c746b140ccd"/>
+    <ds:schemaRef ds:uri="http://schemas.microsoft.com/sharepoint/v3"/>
+    <ds:schemaRef ds:uri="8a43ac29-7517-4eef-8263-50e5e3d65f27"/>
+  </ds:schemaRefs>
+</ds:datastoreItem>
 </file>
</xml_diff>